<commit_message>
Removed 3 min from materials
</commit_message>
<xml_diff>
--- a/ManagingModulesPresentation.pptx
+++ b/ManagingModulesPresentation.pptx
@@ -15,7 +15,7 @@
     <p:sldId id="266" r:id="rId6"/>
     <p:sldId id="272" r:id="rId7"/>
     <p:sldId id="274" r:id="rId8"/>
-    <p:sldId id="265" r:id="rId9"/>
+    <p:sldId id="295" r:id="rId9"/>
     <p:sldId id="264" r:id="rId10"/>
   </p:sldIdLst>
   <p:sldSz cx="12192000" cy="6858000"/>
@@ -127,7 +127,7 @@
             <p14:sldId id="266"/>
             <p14:sldId id="272"/>
             <p14:sldId id="274"/>
-            <p14:sldId id="265"/>
+            <p14:sldId id="295"/>
             <p14:sldId id="264"/>
           </p14:sldIdLst>
         </p14:section>
@@ -222,7 +222,7 @@
           <a:p>
             <a:fld id="{B68C8EF0-277E-4A1A-B62C-6E490FE608D5}" type="datetimeFigureOut">
               <a:rPr lang="en-US" smtClean="0"/>
-              <a:t>4/27/2019</a:t>
+              <a:t>4/29/2019</a:t>
             </a:fld>
             <a:endParaRPr lang="en-US"/>
           </a:p>
@@ -703,7 +703,7 @@
           <a:p>
             <a:fld id="{578FD856-A495-47B8-817B-8CBF03FDE7FA}" type="datetime1">
               <a:rPr lang="en-US" smtClean="0"/>
-              <a:t>4/27/2019</a:t>
+              <a:t>4/29/2019</a:t>
             </a:fld>
             <a:endParaRPr lang="en-US" dirty="0"/>
           </a:p>
@@ -1093,7 +1093,7 @@
         <p:spPr>
           <a:xfrm>
             <a:off x="644770" y="1373960"/>
-            <a:ext cx="8768861" cy="461665"/>
+            <a:ext cx="10427783" cy="830997"/>
           </a:xfrm>
           <a:prstGeom prst="rect">
             <a:avLst/>
@@ -1108,16 +1108,35 @@
           <a:p>
             <a:r>
               <a:rPr lang="en-US" sz="2400" b="0" dirty="0"/>
-              <a:t>Please use the event app or </a:t>
+              <a:t>Please use the event app to submit a session rating!		bit.ly/summit2019app</a:t>
+            </a:r>
+          </a:p>
+          <a:p>
+            <a:r>
+              <a:rPr lang="en-US" sz="2400" b="0" dirty="0"/>
+              <a:t>Send me your feedback on this session @</a:t>
             </a:r>
             <a:r>
               <a:rPr lang="en-US" sz="2400" b="0" dirty="0" err="1"/>
-              <a:t>Sched.com</a:t>
+              <a:t>KevinMarquette</a:t>
             </a:r>
             <a:r>
               <a:rPr lang="en-US" sz="2400" b="0" dirty="0"/>
-              <a:t> to submit a session rating!</a:t>
-            </a:r>
+              <a:t> #</a:t>
+            </a:r>
+            <a:r>
+              <a:rPr lang="en-US" sz="2400" b="0" dirty="0" err="1"/>
+              <a:t>PSHSummit</a:t>
+            </a:r>
+            <a:r>
+              <a:rPr lang="en-US" sz="2400" b="0" dirty="0"/>
+              <a:t> #</a:t>
+            </a:r>
+            <a:r>
+              <a:rPr lang="en-US" sz="2400" b="0" dirty="0" err="1"/>
+              <a:t>PSGraph</a:t>
+            </a:r>
+            <a:endParaRPr lang="en-US" sz="2400" b="0" dirty="0"/>
           </a:p>
         </p:txBody>
       </p:sp>
@@ -1354,7 +1373,7 @@
           <a:p>
             <a:fld id="{59FD2237-3B84-4AC3-A613-A17944D67163}" type="datetime1">
               <a:rPr lang="en-US" smtClean="0"/>
-              <a:t>4/27/2019</a:t>
+              <a:t>4/29/2019</a:t>
             </a:fld>
             <a:endParaRPr lang="en-US" dirty="0"/>
           </a:p>
@@ -1599,7 +1618,7 @@
           <a:p>
             <a:fld id="{4D37F4DE-4CD9-47A3-BAF0-2F3F37405E48}" type="datetime1">
               <a:rPr lang="en-US" smtClean="0"/>
-              <a:t>4/27/2019</a:t>
+              <a:t>4/29/2019</a:t>
             </a:fld>
             <a:endParaRPr lang="en-US" dirty="0"/>
           </a:p>
@@ -1873,7 +1892,7 @@
           <a:p>
             <a:fld id="{B25FD3DA-12F3-4700-8C2B-A5B82CCD9FDF}" type="datetime1">
               <a:rPr lang="en-US" smtClean="0"/>
-              <a:t>4/27/2019</a:t>
+              <a:t>4/29/2019</a:t>
             </a:fld>
             <a:endParaRPr lang="en-US" dirty="0"/>
           </a:p>
@@ -2252,7 +2271,7 @@
           <a:p>
             <a:fld id="{360CF3C9-2460-49F4-AB70-CE6F6904F4A2}" type="datetime1">
               <a:rPr lang="en-US" smtClean="0"/>
-              <a:t>4/27/2019</a:t>
+              <a:t>4/29/2019</a:t>
             </a:fld>
             <a:endParaRPr lang="en-US" dirty="0"/>
           </a:p>
@@ -2384,7 +2403,7 @@
           <a:p>
             <a:fld id="{FE514856-59E5-4A76-8B7F-91DF0A5F9175}" type="datetime1">
               <a:rPr lang="en-US" smtClean="0"/>
-              <a:t>4/27/2019</a:t>
+              <a:t>4/29/2019</a:t>
             </a:fld>
             <a:endParaRPr lang="en-US" dirty="0"/>
           </a:p>
@@ -2494,7 +2513,7 @@
           <a:p>
             <a:fld id="{75077983-9B06-4C15-9A3D-B83C2053871F}" type="datetime1">
               <a:rPr lang="en-US" smtClean="0"/>
-              <a:t>4/27/2019</a:t>
+              <a:t>4/29/2019</a:t>
             </a:fld>
             <a:endParaRPr lang="en-US" dirty="0"/>
           </a:p>
@@ -2784,7 +2803,7 @@
           <a:p>
             <a:fld id="{C13D6E94-07BA-4493-8472-4171109EB88D}" type="datetime1">
               <a:rPr lang="en-US" smtClean="0"/>
-              <a:t>4/27/2019</a:t>
+              <a:t>4/29/2019</a:t>
             </a:fld>
             <a:endParaRPr lang="en-US" dirty="0"/>
           </a:p>
@@ -3051,7 +3070,7 @@
           <a:p>
             <a:fld id="{DEBAA425-7962-477B-B9B1-DD65387D6F76}" type="datetime1">
               <a:rPr lang="en-US" smtClean="0"/>
-              <a:t>4/27/2019</a:t>
+              <a:t>4/29/2019</a:t>
             </a:fld>
             <a:endParaRPr lang="en-US" dirty="0"/>
           </a:p>
@@ -3277,7 +3296,7 @@
           <a:p>
             <a:fld id="{C0551E37-54FE-4ED1-AA63-3577663042E0}" type="datetime1">
               <a:rPr lang="en-US" smtClean="0"/>
-              <a:t>4/27/2019</a:t>
+              <a:t>4/29/2019</a:t>
             </a:fld>
             <a:endParaRPr lang="en-US" dirty="0"/>
           </a:p>
@@ -5511,8 +5530,48 @@
           </a:xfrm>
         </p:spPr>
         <p:txBody>
-          <a:bodyPr/>
-          <a:lstStyle/>
+          <a:bodyPr>
+            <a:normAutofit fontScale="92500" lnSpcReduction="20000"/>
+          </a:bodyPr>
+          <a:lstStyle/>
+          <a:p>
+            <a:r>
+              <a:rPr lang="en-US" i="1" dirty="0"/>
+              <a:t>Basic Repository Creation and Publishing</a:t>
+            </a:r>
+            <a:endParaRPr lang="en-US" dirty="0"/>
+          </a:p>
+          <a:p>
+            <a:r>
+              <a:rPr lang="en-US" i="1" dirty="0"/>
+              <a:t>Using a NuGet Feed</a:t>
+            </a:r>
+            <a:endParaRPr lang="en-US" dirty="0"/>
+          </a:p>
+          <a:p>
+            <a:r>
+              <a:rPr lang="en-US" i="1" dirty="0"/>
+              <a:t>Publish Module Scripts</a:t>
+            </a:r>
+            <a:endParaRPr lang="en-US" dirty="0"/>
+          </a:p>
+          <a:p>
+            <a:r>
+              <a:rPr lang="en-US" i="1" dirty="0"/>
+              <a:t>Hosting public modules internally</a:t>
+            </a:r>
+            <a:endParaRPr lang="en-US" dirty="0"/>
+          </a:p>
+          <a:p>
+            <a:r>
+              <a:rPr lang="en-US" i="1" dirty="0"/>
+              <a:t>System Bootstrapping</a:t>
+            </a:r>
+            <a:endParaRPr lang="en-US" dirty="0"/>
+          </a:p>
+          <a:p>
+            <a:endParaRPr lang="en-US" dirty="0"/>
+          </a:p>
           <a:p>
             <a:endParaRPr lang="en-US" dirty="0"/>
           </a:p>
@@ -6418,7 +6477,156 @@
       </p:grpSpPr>
       <p:sp>
         <p:nvSpPr>
-          <p:cNvPr id="2" name="Footer Placeholder 1"/>
+          <p:cNvPr id="2" name="Rectangle 1"/>
+          <p:cNvSpPr/>
+          <p:nvPr/>
+        </p:nvSpPr>
+        <p:spPr>
+          <a:xfrm>
+            <a:off x="2339112" y="2263297"/>
+            <a:ext cx="6096000" cy="1200329"/>
+          </a:xfrm>
+          <a:prstGeom prst="rect">
+            <a:avLst/>
+          </a:prstGeom>
+        </p:spPr>
+        <p:txBody>
+          <a:bodyPr>
+            <a:spAutoFit/>
+          </a:bodyPr>
+          <a:lstStyle/>
+          <a:p>
+            <a:r>
+              <a:rPr lang="en-US" dirty="0"/>
+              <a:t>Kevin Marquette</a:t>
+            </a:r>
+          </a:p>
+          <a:p>
+            <a:r>
+              <a:rPr lang="en-US" dirty="0"/>
+              <a:t>PowerShellExplained.com</a:t>
+            </a:r>
+          </a:p>
+          <a:p>
+            <a:r>
+              <a:rPr lang="en-US" dirty="0">
+                <a:hlinkClick r:id="rId2"/>
+              </a:rPr>
+              <a:t>KevMar@gmail.com</a:t>
+            </a:r>
+            <a:endParaRPr lang="en-US" dirty="0"/>
+          </a:p>
+          <a:p>
+            <a:r>
+              <a:rPr lang="en-US" dirty="0"/>
+              <a:t>@</a:t>
+            </a:r>
+            <a:r>
+              <a:rPr lang="en-US" dirty="0" err="1"/>
+              <a:t>KevinMarquette</a:t>
+            </a:r>
+            <a:endParaRPr lang="en-US" dirty="0"/>
+          </a:p>
+        </p:txBody>
+      </p:sp>
+      <p:pic>
+        <p:nvPicPr>
+          <p:cNvPr id="3" name="Picture 2"/>
+          <p:cNvPicPr>
+            <a:picLocks noChangeAspect="1"/>
+          </p:cNvPicPr>
+          <p:nvPr/>
+        </p:nvPicPr>
+        <p:blipFill>
+          <a:blip r:embed="rId3">
+            <a:extLst>
+              <a:ext uri="{28A0092B-C50C-407E-A947-70E740481C1C}">
+                <a14:useLocalDpi xmlns:a14="http://schemas.microsoft.com/office/drawing/2010/main" val="0"/>
+              </a:ext>
+            </a:extLst>
+          </a:blip>
+          <a:stretch>
+            <a:fillRect/>
+          </a:stretch>
+        </p:blipFill>
+        <p:spPr>
+          <a:xfrm>
+            <a:off x="796964" y="2263297"/>
+            <a:ext cx="1365663" cy="1365663"/>
+          </a:xfrm>
+          <a:prstGeom prst="ellipse">
+            <a:avLst/>
+          </a:prstGeom>
+          <a:ln w="63500" cap="rnd">
+            <a:solidFill>
+              <a:schemeClr val="bg1"/>
+            </a:solidFill>
+          </a:ln>
+          <a:effectLst/>
+          <a:scene3d>
+            <a:camera prst="orthographicFront"/>
+            <a:lightRig rig="contrasting" dir="t">
+              <a:rot lat="0" lon="0" rev="3000000"/>
+            </a:lightRig>
+          </a:scene3d>
+          <a:sp3d contourW="7620">
+            <a:bevelT w="95250" h="31750"/>
+            <a:contourClr>
+              <a:srgbClr val="333333"/>
+            </a:contourClr>
+          </a:sp3d>
+        </p:spPr>
+      </p:pic>
+      <p:pic>
+        <p:nvPicPr>
+          <p:cNvPr id="1026" name="Picture 2" descr="https://powershellexplained.com/img/MVP_Logo_Horizontal_Preferred_Cyan300_CMYK_72ppi.png"/>
+          <p:cNvPicPr>
+            <a:picLocks noChangeAspect="1" noChangeArrowheads="1"/>
+          </p:cNvPicPr>
+          <p:nvPr/>
+        </p:nvPicPr>
+        <p:blipFill>
+          <a:blip r:embed="rId4">
+            <a:extLst>
+              <a:ext uri="{28A0092B-C50C-407E-A947-70E740481C1C}">
+                <a14:useLocalDpi xmlns:a14="http://schemas.microsoft.com/office/drawing/2010/main" val="0"/>
+              </a:ext>
+            </a:extLst>
+          </a:blip>
+          <a:srcRect/>
+          <a:stretch>
+            <a:fillRect/>
+          </a:stretch>
+        </p:blipFill>
+        <p:spPr bwMode="auto">
+          <a:xfrm>
+            <a:off x="2750993" y="5585546"/>
+            <a:ext cx="1839480" cy="752054"/>
+          </a:xfrm>
+          <a:prstGeom prst="rect">
+            <a:avLst/>
+          </a:prstGeom>
+          <a:noFill/>
+          <a:extLst>
+            <a:ext uri="{909E8E84-426E-40DD-AFC4-6F175D3DCCD1}">
+              <a14:hiddenFill xmlns:a14="http://schemas.microsoft.com/office/drawing/2010/main">
+                <a:solidFill>
+                  <a:srgbClr val="FFFFFF"/>
+                </a:solidFill>
+              </a14:hiddenFill>
+            </a:ext>
+          </a:extLst>
+        </p:spPr>
+      </p:pic>
+      <p:sp>
+        <p:nvSpPr>
+          <p:cNvPr id="5" name="Footer Placeholder 3">
+            <a:extLst>
+              <a:ext uri="{FF2B5EF4-FFF2-40B4-BE49-F238E27FC236}">
+                <a16:creationId xmlns:a16="http://schemas.microsoft.com/office/drawing/2014/main" id="{96B6D80E-CA6B-42CA-A79A-431823F81F84}"/>
+              </a:ext>
+            </a:extLst>
+          </p:cNvPr>
           <p:cNvSpPr>
             <a:spLocks noGrp="1"/>
           </p:cNvSpPr>
@@ -6426,23 +6634,35 @@
             <p:ph type="ftr" sz="quarter" idx="11"/>
           </p:nvPr>
         </p:nvSpPr>
-        <p:spPr/>
+        <p:spPr>
+          <a:xfrm>
+            <a:off x="4038600" y="6356350"/>
+            <a:ext cx="4114800" cy="365125"/>
+          </a:xfrm>
+        </p:spPr>
         <p:txBody>
           <a:bodyPr/>
           <a:lstStyle/>
           <a:p>
             <a:r>
-              <a:rPr lang="en-US"/>
-              <a:t>@KevinMarquette #PSHSummit #KM404</a:t>
-            </a:r>
-            <a:endParaRPr lang="en-US" dirty="0"/>
+              <a:rPr lang="en-US" dirty="0"/>
+              <a:t>#</a:t>
+            </a:r>
+            <a:r>
+              <a:rPr lang="en-US" dirty="0" err="1"/>
+              <a:t>PSHSummit</a:t>
+            </a:r>
+            <a:r>
+              <a:rPr lang="en-US" dirty="0"/>
+              <a:t> #KM401</a:t>
+            </a:r>
           </a:p>
         </p:txBody>
       </p:sp>
     </p:spTree>
     <p:extLst>
       <p:ext uri="{BB962C8B-B14F-4D97-AF65-F5344CB8AC3E}">
-        <p14:creationId xmlns:p14="http://schemas.microsoft.com/office/powerpoint/2010/main" val="102638022"/>
+        <p14:creationId xmlns:p14="http://schemas.microsoft.com/office/powerpoint/2010/main" val="2329025"/>
       </p:ext>
     </p:extLst>
   </p:cSld>

</xml_diff>